<commit_message>
transactions working for digitalocean
</commit_message>
<xml_diff>
--- a/docs/subsidy_object_status_codes.pptx
+++ b/docs/subsidy_object_status_codes.pptx
@@ -215,7 +215,7 @@
           <a:p>
             <a:fld id="{DC353533-40E1-4EDF-B1A5-107A4986D4C8}" type="datetimeFigureOut">
               <a:rPr lang="en-US" smtClean="0"/>
-              <a:t>4/12/18</a:t>
+              <a:t>4/17/18</a:t>
             </a:fld>
             <a:endParaRPr lang="en-US"/>
           </a:p>
@@ -26497,6 +26497,22 @@
               <a:t>GET /subsidies</a:t>
             </a:r>
           </a:p>
+          <a:p>
+            <a:pPr algn="ctr"/>
+            <a:r>
+              <a:rPr lang="en-GB" sz="1200" b="1">
+                <a:solidFill>
+                  <a:schemeClr val="bg1"/>
+                </a:solidFill>
+              </a:rPr>
+              <a:t>/{id}</a:t>
+            </a:r>
+            <a:endParaRPr lang="en-GB" sz="1200" b="1" dirty="0">
+              <a:solidFill>
+                <a:schemeClr val="bg1"/>
+              </a:solidFill>
+            </a:endParaRPr>
+          </a:p>
         </p:txBody>
       </p:sp>
       <p:cxnSp>

</xml_diff>